<commit_message>
add presention slide and pdf with edition
</commit_message>
<xml_diff>
--- a/docs/Shooting_aircraft_breakout_pygame.pptx
+++ b/docs/Shooting_aircraft_breakout_pygame.pptx
@@ -5,7 +5,7 @@
     <p:sldMasterId id="2147483732" r:id="rId1"/>
   </p:sldMasterIdLst>
   <p:notesMasterIdLst>
-    <p:notesMasterId r:id="rId16"/>
+    <p:notesMasterId r:id="rId15"/>
   </p:notesMasterIdLst>
   <p:sldIdLst>
     <p:sldId id="359" r:id="rId2"/>
@@ -20,8 +20,7 @@
     <p:sldId id="393" r:id="rId11"/>
     <p:sldId id="394" r:id="rId12"/>
     <p:sldId id="395" r:id="rId13"/>
-    <p:sldId id="401" r:id="rId14"/>
-    <p:sldId id="353" r:id="rId15"/>
+    <p:sldId id="353" r:id="rId14"/>
   </p:sldIdLst>
   <p:sldSz cx="9144000" cy="6858000" type="screen4x3"/>
   <p:notesSz cx="6858000" cy="9144000"/>
@@ -1447,9 +1446,9 @@
           <a:bodyPr/>
           <a:lstStyle/>
           <a:p>
-            <a:fld id="{5263D070-797B-ED4C-83FE-AEA96E501FA7}" type="datetime1">
+            <a:fld id="{F5552C79-1448-478F-8826-A714958CF9DA}" type="datetime1">
               <a:rPr lang="en-US" smtClean="0"/>
-              <a:t>10/23/2022</a:t>
+              <a:t>10/24/2022</a:t>
             </a:fld>
             <a:endParaRPr lang="en-US"/>
           </a:p>
@@ -1668,9 +1667,9 @@
           <a:bodyPr/>
           <a:lstStyle/>
           <a:p>
-            <a:fld id="{9F920EA0-4B84-334E-B078-74C5B73090F1}" type="datetime1">
+            <a:fld id="{B8794203-C630-48CD-AB45-810465936C7C}" type="datetime1">
               <a:rPr lang="en-US" smtClean="0"/>
-              <a:t>10/23/2022</a:t>
+              <a:t>10/24/2022</a:t>
             </a:fld>
             <a:endParaRPr lang="en-US"/>
           </a:p>
@@ -1939,9 +1938,9 @@
           <a:bodyPr/>
           <a:lstStyle/>
           <a:p>
-            <a:fld id="{BC8E9457-5BF3-7F4C-B6F5-E0D9F3677F81}" type="datetime1">
+            <a:fld id="{98D13B8F-F1A1-40E5-B8DB-019E39EC48B7}" type="datetime1">
               <a:rPr lang="en-US" smtClean="0"/>
-              <a:t>10/23/2022</a:t>
+              <a:t>10/24/2022</a:t>
             </a:fld>
             <a:endParaRPr lang="en-US"/>
           </a:p>
@@ -2159,9 +2158,9 @@
           <a:bodyPr/>
           <a:lstStyle/>
           <a:p>
-            <a:fld id="{E078FC16-D2B3-C043-A1F7-2DA10227212B}" type="datetime1">
+            <a:fld id="{A6194697-6F0F-4063-9825-12BDB116D70B}" type="datetime1">
               <a:rPr lang="en-US" smtClean="0"/>
-              <a:t>10/23/2022</a:t>
+              <a:t>10/24/2022</a:t>
             </a:fld>
             <a:endParaRPr lang="en-US"/>
           </a:p>
@@ -2523,9 +2522,9 @@
           <a:bodyPr/>
           <a:lstStyle/>
           <a:p>
-            <a:fld id="{94486295-D9B9-8747-9C18-D5C7DC1F2D60}" type="datetime1">
+            <a:fld id="{E54946C5-1D4A-45D4-821C-934CD07D4E8E}" type="datetime1">
               <a:rPr lang="en-US" smtClean="0"/>
-              <a:t>10/23/2022</a:t>
+              <a:t>10/24/2022</a:t>
             </a:fld>
             <a:endParaRPr lang="en-US"/>
           </a:p>
@@ -2807,9 +2806,9 @@
           <a:bodyPr/>
           <a:lstStyle/>
           <a:p>
-            <a:fld id="{37CEF6AB-7026-CD41-9ED4-98B5B67DFA3D}" type="datetime1">
+            <a:fld id="{311F62A6-15A2-496C-B734-61B19E6A84C2}" type="datetime1">
               <a:rPr lang="en-US" smtClean="0"/>
-              <a:t>10/23/2022</a:t>
+              <a:t>10/24/2022</a:t>
             </a:fld>
             <a:endParaRPr lang="en-US"/>
           </a:p>
@@ -3228,9 +3227,9 @@
           <a:bodyPr/>
           <a:lstStyle/>
           <a:p>
-            <a:fld id="{87EB0EE5-80A3-1540-9C32-0E9296F76541}" type="datetime1">
+            <a:fld id="{B6372896-8D10-4362-B6B6-A561FF9EC3EE}" type="datetime1">
               <a:rPr lang="en-US" smtClean="0"/>
-              <a:t>10/23/2022</a:t>
+              <a:t>10/24/2022</a:t>
             </a:fld>
             <a:endParaRPr lang="en-US"/>
           </a:p>
@@ -3340,9 +3339,9 @@
           <a:bodyPr/>
           <a:lstStyle/>
           <a:p>
-            <a:fld id="{543BD460-9547-E943-8C8E-97BA9006D4CE}" type="datetime1">
+            <a:fld id="{4D91BB11-101F-452A-B841-FEA1EA026116}" type="datetime1">
               <a:rPr lang="en-US" smtClean="0"/>
-              <a:t>10/23/2022</a:t>
+              <a:t>10/24/2022</a:t>
             </a:fld>
             <a:endParaRPr lang="en-US"/>
           </a:p>
@@ -3430,9 +3429,9 @@
           <a:bodyPr/>
           <a:lstStyle/>
           <a:p>
-            <a:fld id="{C0A2BB35-0350-0A4F-B7C7-2D4EAB62C225}" type="datetime1">
+            <a:fld id="{D7B5184D-765C-4FFD-9E83-21D92139F06E}" type="datetime1">
               <a:rPr lang="en-US" smtClean="0"/>
-              <a:t>10/23/2022</a:t>
+              <a:t>10/24/2022</a:t>
             </a:fld>
             <a:endParaRPr lang="en-US"/>
           </a:p>
@@ -3707,9 +3706,9 @@
           <a:bodyPr/>
           <a:lstStyle/>
           <a:p>
-            <a:fld id="{C54391D5-2B6D-AF4B-ADD9-ACC8F035B63E}" type="datetime1">
+            <a:fld id="{2B9FD254-A71A-49E4-A516-F8CCD6BE68C1}" type="datetime1">
               <a:rPr lang="en-US" smtClean="0"/>
-              <a:t>10/23/2022</a:t>
+              <a:t>10/24/2022</a:t>
             </a:fld>
             <a:endParaRPr lang="en-US"/>
           </a:p>
@@ -4068,9 +4067,9 @@
           <a:bodyPr/>
           <a:lstStyle/>
           <a:p>
-            <a:fld id="{04D6315A-D661-C142-9D5C-4B731D746EE2}" type="datetime1">
+            <a:fld id="{C71AD375-D445-4A8D-B351-3407C47044C5}" type="datetime1">
               <a:rPr lang="en-US" smtClean="0"/>
-              <a:t>10/23/2022</a:t>
+              <a:t>10/24/2022</a:t>
             </a:fld>
             <a:endParaRPr lang="en-US"/>
           </a:p>
@@ -4491,9 +4490,9 @@
             <a:extLst/>
           </a:lstStyle>
           <a:p>
-            <a:fld id="{104726D7-C75B-6249-8267-2331293A71AC}" type="datetime1">
+            <a:fld id="{F3480EFC-84B3-46B9-BC5D-116B996F68B5}" type="datetime1">
               <a:rPr lang="en-US" smtClean="0"/>
-              <a:t>10/23/2022</a:t>
+              <a:t>10/24/2022</a:t>
             </a:fld>
             <a:endParaRPr lang="en-US"/>
           </a:p>
@@ -5146,12 +5145,12 @@
           <a:bodyPr/>
           <a:lstStyle/>
           <a:p>
-            <a:fld id="{AE36A67C-A917-7342-864D-542D16516278}" type="datetime1">
+            <a:fld id="{B51884CB-0042-475B-AB34-1CED5BAD103C}" type="datetime1">
               <a:rPr lang="en-US" smtClean="0">
                 <a:latin typeface="Calibri (Body)"/>
                 <a:cs typeface="Arial" panose="020B0604020202020204" pitchFamily="34" charset="0"/>
               </a:rPr>
-              <a:t>10/23/2022</a:t>
+              <a:t>10/24/2022</a:t>
             </a:fld>
             <a:endParaRPr lang="en-US" dirty="0">
               <a:latin typeface="Calibri (Body)"/>
@@ -5313,12 +5312,12 @@
           <a:bodyPr/>
           <a:lstStyle/>
           <a:p>
-            <a:fld id="{AE36A67C-A917-7342-864D-542D16516278}" type="datetime1">
+            <a:fld id="{99FB0C7A-2212-40BA-81C3-36E0F3421253}" type="datetime1">
               <a:rPr lang="en-US" smtClean="0">
                 <a:latin typeface="Calibri (Body)"/>
                 <a:cs typeface="Arial" panose="020B0604020202020204" pitchFamily="34" charset="0"/>
               </a:rPr>
-              <a:t>10/23/2022</a:t>
+              <a:t>10/24/2022</a:t>
             </a:fld>
             <a:endParaRPr lang="en-US" dirty="0">
               <a:latin typeface="Calibri (Body)"/>
@@ -5454,7 +5453,7 @@
                 <a:latin typeface="Calibri (Body)"/>
                 <a:cs typeface="Arial" panose="020B0604020202020204" pitchFamily="34" charset="0"/>
               </a:rPr>
-              <a:t>Game Over</a:t>
+              <a:t>Game Over and Termination</a:t>
             </a:r>
           </a:p>
         </p:txBody>
@@ -5480,12 +5479,12 @@
           <a:bodyPr/>
           <a:lstStyle/>
           <a:p>
-            <a:fld id="{AE36A67C-A917-7342-864D-542D16516278}" type="datetime1">
+            <a:fld id="{6722C759-F07F-4036-86E0-9D33AE4392F8}" type="datetime1">
               <a:rPr lang="en-US" smtClean="0">
                 <a:latin typeface="Calibri (Body)"/>
                 <a:cs typeface="Arial" panose="020B0604020202020204" pitchFamily="34" charset="0"/>
               </a:rPr>
-              <a:t>10/23/2022</a:t>
+              <a:t>10/24/2022</a:t>
             </a:fld>
             <a:endParaRPr lang="en-US" dirty="0">
               <a:latin typeface="Calibri (Body)"/>
@@ -5598,205 +5597,6 @@
       </p:grpSpPr>
       <p:sp>
         <p:nvSpPr>
-          <p:cNvPr id="2" name="Title 1"/>
-          <p:cNvSpPr>
-            <a:spLocks noGrp="1"/>
-          </p:cNvSpPr>
-          <p:nvPr>
-            <p:ph type="title"/>
-          </p:nvPr>
-        </p:nvSpPr>
-        <p:spPr/>
-        <p:txBody>
-          <a:bodyPr/>
-          <a:lstStyle/>
-          <a:p>
-            <a:r>
-              <a:rPr lang="en-US" dirty="0">
-                <a:solidFill>
-                  <a:srgbClr val="FFC000"/>
-                </a:solidFill>
-                <a:latin typeface="Calibri (Body)"/>
-                <a:cs typeface="Arial" panose="020B0604020202020204" pitchFamily="34" charset="0"/>
-              </a:rPr>
-              <a:t>Conclusion</a:t>
-            </a:r>
-          </a:p>
-        </p:txBody>
-      </p:sp>
-      <p:sp>
-        <p:nvSpPr>
-          <p:cNvPr id="3" name="Content Placeholder 2"/>
-          <p:cNvSpPr>
-            <a:spLocks noGrp="1"/>
-          </p:cNvSpPr>
-          <p:nvPr>
-            <p:ph idx="1"/>
-          </p:nvPr>
-        </p:nvSpPr>
-        <p:spPr>
-          <a:xfrm>
-            <a:off x="457200" y="1219201"/>
-            <a:ext cx="8686800" cy="1447799"/>
-          </a:xfrm>
-        </p:spPr>
-        <p:txBody>
-          <a:bodyPr>
-            <a:noAutofit/>
-          </a:bodyPr>
-          <a:lstStyle/>
-          <a:p>
-            <a:pPr>
-              <a:buClr>
-                <a:srgbClr val="FFC000"/>
-              </a:buClr>
-              <a:buSzPct val="100000"/>
-              <a:buFont typeface="Wingdings" pitchFamily="2" charset="2"/>
-              <a:buChar char="§"/>
-            </a:pPr>
-            <a:endParaRPr lang="en-US" sz="2000" dirty="0">
-              <a:latin typeface="Calibri (Body)"/>
-              <a:cs typeface="Arial" panose="020B0604020202020204" pitchFamily="34" charset="0"/>
-            </a:endParaRPr>
-          </a:p>
-          <a:p>
-            <a:pPr>
-              <a:buClr>
-                <a:srgbClr val="FFC000"/>
-              </a:buClr>
-              <a:buSzPct val="100000"/>
-              <a:buFont typeface="Wingdings" pitchFamily="2" charset="2"/>
-              <a:buChar char="§"/>
-            </a:pPr>
-            <a:r>
-              <a:rPr lang="en-US" sz="2000" dirty="0">
-                <a:latin typeface="Calibri (Body)"/>
-                <a:cs typeface="Arial" panose="020B0604020202020204" pitchFamily="34" charset="0"/>
-              </a:rPr>
-              <a:t>The collision detection algorithm is used for the collision between ball and brick</a:t>
-            </a:r>
-          </a:p>
-          <a:p>
-            <a:pPr>
-              <a:buClr>
-                <a:srgbClr val="FFC000"/>
-              </a:buClr>
-              <a:buSzPct val="100000"/>
-              <a:buFont typeface="Wingdings" pitchFamily="2" charset="2"/>
-              <a:buChar char="§"/>
-            </a:pPr>
-            <a:endParaRPr lang="en-GB" sz="2000" dirty="0">
-              <a:latin typeface="Calibri (Body)"/>
-              <a:cs typeface="Arial" panose="020B0604020202020204" pitchFamily="34" charset="0"/>
-            </a:endParaRPr>
-          </a:p>
-        </p:txBody>
-      </p:sp>
-      <p:sp>
-        <p:nvSpPr>
-          <p:cNvPr id="6" name="Date Placeholder 5">
-            <a:extLst>
-              <a:ext uri="{FF2B5EF4-FFF2-40B4-BE49-F238E27FC236}">
-                <a16:creationId xmlns:a16="http://schemas.microsoft.com/office/drawing/2014/main" id="{DD56BD70-9023-1140-8A18-B500C39A3A6F}"/>
-              </a:ext>
-            </a:extLst>
-          </p:cNvPr>
-          <p:cNvSpPr>
-            <a:spLocks noGrp="1"/>
-          </p:cNvSpPr>
-          <p:nvPr>
-            <p:ph type="dt" sz="half" idx="10"/>
-          </p:nvPr>
-        </p:nvSpPr>
-        <p:spPr/>
-        <p:txBody>
-          <a:bodyPr/>
-          <a:lstStyle/>
-          <a:p>
-            <a:fld id="{7185BA0E-5B37-A248-8041-AD5A1B5E585E}" type="datetime1">
-              <a:rPr lang="en-US" smtClean="0">
-                <a:latin typeface="Calibri (Body)"/>
-                <a:cs typeface="Arial" panose="020B0604020202020204" pitchFamily="34" charset="0"/>
-              </a:rPr>
-              <a:t>10/23/2022</a:t>
-            </a:fld>
-            <a:endParaRPr lang="en-US">
-              <a:latin typeface="Calibri (Body)"/>
-              <a:cs typeface="Arial" panose="020B0604020202020204" pitchFamily="34" charset="0"/>
-            </a:endParaRPr>
-          </a:p>
-        </p:txBody>
-      </p:sp>
-      <p:sp>
-        <p:nvSpPr>
-          <p:cNvPr id="4" name="Slide Number Placeholder 3"/>
-          <p:cNvSpPr>
-            <a:spLocks noGrp="1"/>
-          </p:cNvSpPr>
-          <p:nvPr>
-            <p:ph type="sldNum" sz="quarter" idx="12"/>
-          </p:nvPr>
-        </p:nvSpPr>
-        <p:spPr/>
-        <p:txBody>
-          <a:bodyPr/>
-          <a:lstStyle/>
-          <a:p>
-            <a:fld id="{302755A7-14C3-4271-9743-D1DE7E0E674B}" type="slidenum">
-              <a:rPr lang="en-US" smtClean="0">
-                <a:latin typeface="Calibri (Body)"/>
-                <a:cs typeface="Arial" panose="020B0604020202020204" pitchFamily="34" charset="0"/>
-              </a:rPr>
-              <a:pPr/>
-              <a:t>13</a:t>
-            </a:fld>
-            <a:endParaRPr lang="en-US" dirty="0">
-              <a:latin typeface="Calibri (Body)"/>
-              <a:cs typeface="Arial" panose="020B0604020202020204" pitchFamily="34" charset="0"/>
-            </a:endParaRPr>
-          </a:p>
-        </p:txBody>
-      </p:sp>
-    </p:spTree>
-    <p:extLst>
-      <p:ext uri="{BB962C8B-B14F-4D97-AF65-F5344CB8AC3E}">
-        <p14:creationId xmlns:p14="http://schemas.microsoft.com/office/powerpoint/2010/main" val="1847235715"/>
-      </p:ext>
-    </p:extLst>
-  </p:cSld>
-  <p:clrMapOvr>
-    <a:masterClrMapping/>
-  </p:clrMapOvr>
-  <mc:AlternateContent xmlns:mc="http://schemas.openxmlformats.org/markup-compatibility/2006" xmlns:p14="http://schemas.microsoft.com/office/powerpoint/2010/main">
-    <mc:Choice Requires="p14">
-      <p:transition spd="slow" p14:dur="2000" advTm="75363"/>
-    </mc:Choice>
-    <mc:Fallback xmlns="">
-      <p:transition spd="slow" advTm="75363"/>
-    </mc:Fallback>
-  </mc:AlternateContent>
-</p:sld>
-</file>
-
-<file path=ppt/slides/slide14.xml><?xml version="1.0" encoding="utf-8"?>
-<p:sld xmlns:a="http://schemas.openxmlformats.org/drawingml/2006/main" xmlns:r="http://schemas.openxmlformats.org/officeDocument/2006/relationships" xmlns:p="http://schemas.openxmlformats.org/presentationml/2006/main">
-  <p:cSld>
-    <p:spTree>
-      <p:nvGrpSpPr>
-        <p:cNvPr id="1" name=""/>
-        <p:cNvGrpSpPr/>
-        <p:nvPr/>
-      </p:nvGrpSpPr>
-      <p:grpSpPr>
-        <a:xfrm>
-          <a:off x="0" y="0"/>
-          <a:ext cx="0" cy="0"/>
-          <a:chOff x="0" y="0"/>
-          <a:chExt cx="0" cy="0"/>
-        </a:xfrm>
-      </p:grpSpPr>
-      <p:sp>
-        <p:nvSpPr>
           <p:cNvPr id="2" name="Title 1">
             <a:extLst>
               <a:ext uri="{FF2B5EF4-FFF2-40B4-BE49-F238E27FC236}">
@@ -5924,8 +5724,8 @@
         </p:nvSpPr>
         <p:spPr>
           <a:xfrm>
-            <a:off x="457200" y="1143000"/>
-            <a:ext cx="8229600" cy="4800600"/>
+            <a:off x="457200" y="609600"/>
+            <a:ext cx="8229600" cy="4495800"/>
           </a:xfrm>
         </p:spPr>
         <p:txBody>
@@ -5934,9 +5734,25 @@
           </a:bodyPr>
           <a:lstStyle/>
           <a:p>
+            <a:pPr marL="89154" indent="0">
+              <a:lnSpc>
+                <a:spcPct val="150000"/>
+              </a:lnSpc>
+              <a:buClr>
+                <a:srgbClr val="FFC000"/>
+              </a:buClr>
+              <a:buSzPct val="100000"/>
+              <a:buNone/>
+            </a:pPr>
+            <a:endParaRPr lang="en-US" sz="2800" dirty="0">
+              <a:latin typeface="Calibri (Body)"/>
+              <a:cs typeface="Arial" panose="020B0604020202020204" pitchFamily="34" charset="0"/>
+            </a:endParaRPr>
+          </a:p>
+          <a:p>
             <a:pPr>
               <a:lnSpc>
-                <a:spcPct val="150000"/>
+                <a:spcPct val="200000"/>
               </a:lnSpc>
               <a:buClr>
                 <a:srgbClr val="FFC000"/>
@@ -5945,15 +5761,18 @@
               <a:buFont typeface="Wingdings" pitchFamily="2" charset="2"/>
               <a:buChar char="§"/>
             </a:pPr>
-            <a:endParaRPr lang="en-US" sz="2800" dirty="0">
-              <a:latin typeface="Calibri (Body)"/>
-              <a:cs typeface="Arial" panose="020B0604020202020204" pitchFamily="34" charset="0"/>
-            </a:endParaRPr>
+            <a:r>
+              <a:rPr lang="en-US" sz="2400" dirty="0">
+                <a:latin typeface="Calibri (Body)"/>
+                <a:cs typeface="Arial" panose="020B0604020202020204" pitchFamily="34" charset="0"/>
+              </a:rPr>
+              <a:t>Introduction</a:t>
+            </a:r>
           </a:p>
           <a:p>
             <a:pPr>
               <a:lnSpc>
-                <a:spcPct val="150000"/>
+                <a:spcPct val="200000"/>
               </a:lnSpc>
               <a:buClr>
                 <a:srgbClr val="FFC000"/>
@@ -5967,13 +5786,13 @@
                 <a:latin typeface="Calibri (Body)"/>
                 <a:cs typeface="Arial" panose="020B0604020202020204" pitchFamily="34" charset="0"/>
               </a:rPr>
-              <a:t>Introduction</a:t>
+              <a:t>Game overview</a:t>
             </a:r>
           </a:p>
           <a:p>
             <a:pPr>
               <a:lnSpc>
-                <a:spcPct val="150000"/>
+                <a:spcPct val="200000"/>
               </a:lnSpc>
               <a:buClr>
                 <a:srgbClr val="FFC000"/>
@@ -5987,13 +5806,13 @@
                 <a:latin typeface="Calibri (Body)"/>
                 <a:cs typeface="Arial" panose="020B0604020202020204" pitchFamily="34" charset="0"/>
               </a:rPr>
-              <a:t>Game overview</a:t>
+              <a:t>Game logic and rules</a:t>
             </a:r>
           </a:p>
           <a:p>
             <a:pPr>
               <a:lnSpc>
-                <a:spcPct val="150000"/>
+                <a:spcPct val="200000"/>
               </a:lnSpc>
               <a:buClr>
                 <a:srgbClr val="FFC000"/>
@@ -6007,13 +5826,13 @@
                 <a:latin typeface="Calibri (Body)"/>
                 <a:cs typeface="Arial" panose="020B0604020202020204" pitchFamily="34" charset="0"/>
               </a:rPr>
-              <a:t>Game logic and rules</a:t>
+              <a:t>Winning scenario</a:t>
             </a:r>
           </a:p>
           <a:p>
             <a:pPr>
               <a:lnSpc>
-                <a:spcPct val="150000"/>
+                <a:spcPct val="200000"/>
               </a:lnSpc>
               <a:buClr>
                 <a:srgbClr val="FFC000"/>
@@ -6027,27 +5846,7 @@
                 <a:latin typeface="Calibri (Body)"/>
                 <a:cs typeface="Arial" panose="020B0604020202020204" pitchFamily="34" charset="0"/>
               </a:rPr>
-              <a:t>Winning scenario and game over</a:t>
-            </a:r>
-          </a:p>
-          <a:p>
-            <a:pPr>
-              <a:lnSpc>
-                <a:spcPct val="150000"/>
-              </a:lnSpc>
-              <a:buClr>
-                <a:srgbClr val="FFC000"/>
-              </a:buClr>
-              <a:buSzPct val="100000"/>
-              <a:buFont typeface="Wingdings" pitchFamily="2" charset="2"/>
-              <a:buChar char="§"/>
-            </a:pPr>
-            <a:r>
-              <a:rPr lang="en-US" sz="2400" dirty="0">
-                <a:latin typeface="Calibri (Body)"/>
-                <a:cs typeface="Arial" panose="020B0604020202020204" pitchFamily="34" charset="0"/>
-              </a:rPr>
-              <a:t>Conclusion</a:t>
+              <a:t> Game over and termination</a:t>
             </a:r>
           </a:p>
           <a:p>
@@ -6089,14 +5888,14 @@
           <a:bodyPr/>
           <a:lstStyle/>
           <a:p>
-            <a:fld id="{AFED2BF6-669D-1F4E-84A8-B073E4867AFC}" type="datetime1">
+            <a:fld id="{1C0CB6FC-E739-421B-87BD-23C1246F6396}" type="datetime1">
               <a:rPr lang="en-US" smtClean="0">
                 <a:latin typeface="Calibri (Body)"/>
                 <a:cs typeface="Arial" panose="020B0604020202020204" pitchFamily="34" charset="0"/>
               </a:rPr>
-              <a:t>10/23/2022</a:t>
+              <a:t>10/24/2022</a:t>
             </a:fld>
-            <a:endParaRPr lang="en-US">
+            <a:endParaRPr lang="en-US" dirty="0">
               <a:latin typeface="Calibri (Body)"/>
               <a:cs typeface="Arial" panose="020B0604020202020204" pitchFamily="34" charset="0"/>
             </a:endParaRPr>
@@ -6241,7 +6040,7 @@
                 <a:latin typeface="Calibri (Body)"/>
                 <a:cs typeface="Arial" panose="020B0604020202020204" pitchFamily="34" charset="0"/>
               </a:rPr>
-              <a:t>pygame</a:t>
+              <a:t>PyGame</a:t>
             </a:r>
             <a:r>
               <a:rPr lang="en-US" sz="2000" dirty="0">
@@ -6265,7 +6064,7 @@
                 <a:latin typeface="Calibri (Body)"/>
                 <a:cs typeface="Arial" panose="020B0604020202020204" pitchFamily="34" charset="0"/>
               </a:rPr>
-              <a:t>The game consist of different elements such as paddle, brick, ball</a:t>
+              <a:t>The game consist of different elements such as paddle, bricks, and balls.</a:t>
             </a:r>
           </a:p>
           <a:p>
@@ -6282,7 +6081,7 @@
                 <a:latin typeface="Calibri (Body)"/>
                 <a:cs typeface="Arial" panose="020B0604020202020204" pitchFamily="34" charset="0"/>
               </a:rPr>
-              <a:t>The score is increased when a ball collision with a brick</a:t>
+              <a:t>The score is increased when a ball collides with a brick</a:t>
             </a:r>
           </a:p>
           <a:p>
@@ -6322,12 +6121,12 @@
           <a:bodyPr/>
           <a:lstStyle/>
           <a:p>
-            <a:fld id="{7185BA0E-5B37-A248-8041-AD5A1B5E585E}" type="datetime1">
+            <a:fld id="{0B143712-E75F-4CD9-8D22-952904C5EC3A}" type="datetime1">
               <a:rPr lang="en-US" smtClean="0">
                 <a:latin typeface="Calibri (Body)"/>
                 <a:cs typeface="Arial" panose="020B0604020202020204" pitchFamily="34" charset="0"/>
               </a:rPr>
-              <a:t>10/23/2022</a:t>
+              <a:t>10/24/2022</a:t>
             </a:fld>
             <a:endParaRPr lang="en-US">
               <a:latin typeface="Calibri (Body)"/>
@@ -6576,12 +6375,12 @@
           <a:bodyPr/>
           <a:lstStyle/>
           <a:p>
-            <a:fld id="{AE36A67C-A917-7342-864D-542D16516278}" type="datetime1">
+            <a:fld id="{99833213-29E4-4E07-8EBF-E9A4B19403EA}" type="datetime1">
               <a:rPr lang="en-US" smtClean="0">
                 <a:latin typeface="Calibri (Body)"/>
                 <a:cs typeface="Arial" panose="020B0604020202020204" pitchFamily="34" charset="0"/>
               </a:rPr>
-              <a:t>10/23/2022</a:t>
+              <a:t>10/24/2022</a:t>
             </a:fld>
             <a:endParaRPr lang="en-US" dirty="0">
               <a:latin typeface="Calibri (Body)"/>
@@ -6744,12 +6543,12 @@
           <a:bodyPr/>
           <a:lstStyle/>
           <a:p>
-            <a:fld id="{AE36A67C-A917-7342-864D-542D16516278}" type="datetime1">
+            <a:fld id="{4DC3BCC9-EA7F-4DBF-BF85-5F9FDDCDA70A}" type="datetime1">
               <a:rPr lang="en-US" smtClean="0">
                 <a:latin typeface="Calibri (Body)"/>
                 <a:cs typeface="Arial" panose="020B0604020202020204" pitchFamily="34" charset="0"/>
               </a:rPr>
-              <a:t>10/23/2022</a:t>
+              <a:t>10/24/2022</a:t>
             </a:fld>
             <a:endParaRPr lang="en-US" dirty="0">
               <a:latin typeface="Calibri (Body)"/>
@@ -6961,12 +6760,12 @@
           <a:bodyPr/>
           <a:lstStyle/>
           <a:p>
-            <a:fld id="{AE36A67C-A917-7342-864D-542D16516278}" type="datetime1">
+            <a:fld id="{5D7CCE88-AA9E-4A93-9FE8-B2BEC03340F6}" type="datetime1">
               <a:rPr lang="en-US" smtClean="0">
                 <a:latin typeface="Calibri (Body)"/>
                 <a:cs typeface="Arial" panose="020B0604020202020204" pitchFamily="34" charset="0"/>
               </a:rPr>
-              <a:t>10/23/2022</a:t>
+              <a:t>10/24/2022</a:t>
             </a:fld>
             <a:endParaRPr lang="en-US" dirty="0">
               <a:latin typeface="Calibri (Body)"/>
@@ -7128,12 +6927,12 @@
           <a:bodyPr/>
           <a:lstStyle/>
           <a:p>
-            <a:fld id="{AE36A67C-A917-7342-864D-542D16516278}" type="datetime1">
+            <a:fld id="{5D44EDF7-10D9-4917-98E8-7249EE17103D}" type="datetime1">
               <a:rPr lang="en-US" smtClean="0">
                 <a:latin typeface="Calibri (Body)"/>
                 <a:cs typeface="Arial" panose="020B0604020202020204" pitchFamily="34" charset="0"/>
               </a:rPr>
-              <a:t>10/23/2022</a:t>
+              <a:t>10/24/2022</a:t>
             </a:fld>
             <a:endParaRPr lang="en-US" dirty="0">
               <a:latin typeface="Calibri (Body)"/>
@@ -7345,12 +7144,12 @@
           <a:bodyPr/>
           <a:lstStyle/>
           <a:p>
-            <a:fld id="{AE36A67C-A917-7342-864D-542D16516278}" type="datetime1">
+            <a:fld id="{6E8E6977-B40D-41FA-A827-28C706B915A7}" type="datetime1">
               <a:rPr lang="en-US" smtClean="0">
                 <a:latin typeface="Calibri (Body)"/>
                 <a:cs typeface="Arial" panose="020B0604020202020204" pitchFamily="34" charset="0"/>
               </a:rPr>
-              <a:t>10/23/2022</a:t>
+              <a:t>10/24/2022</a:t>
             </a:fld>
             <a:endParaRPr lang="en-US" dirty="0">
               <a:latin typeface="Calibri (Body)"/>

</xml_diff>